<commit_message>
files from lord demo
</commit_message>
<xml_diff>
--- a/2019-07-19 Lord IT User Group/Why PowerShell.pptx
+++ b/2019-07-19 Lord IT User Group/Why PowerShell.pptx
@@ -109,6 +109,11 @@
       </a:defRPr>
     </a:lvl9pPr>
   </p:defaultTextStyle>
+  <p:extLst>
+    <p:ext uri="{EFAFB233-063F-42B5-8137-9DF3F51BA10A}">
+      <p15:sldGuideLst xmlns:p15="http://schemas.microsoft.com/office/powerpoint/2012/main"/>
+    </p:ext>
+  </p:extLst>
 </p:presentation>
 </file>
 
@@ -308,7 +313,7 @@
           <a:p>
             <a:fld id="{ECD19FB2-3AAB-4D03-B13A-2960828C78E3}" type="datetimeFigureOut">
               <a:rPr lang="en-US" dirty="0"/>
-              <a:t>7/17/2019</a:t>
+              <a:t>7/18/2019</a:t>
             </a:fld>
             <a:endParaRPr lang="en-US" dirty="0"/>
           </a:p>
@@ -585,7 +590,7 @@
           <a:p>
             <a:fld id="{1B80C674-7DFC-42FE-B9CD-82963CDB1557}" type="datetimeFigureOut">
               <a:rPr lang="en-US" dirty="0"/>
-              <a:t>7/17/2019</a:t>
+              <a:t>7/18/2019</a:t>
             </a:fld>
             <a:endParaRPr lang="en-US" dirty="0"/>
           </a:p>
@@ -772,7 +777,7 @@
           <a:p>
             <a:fld id="{2076456F-F47D-4F25-8053-2A695DA0CA7D}" type="datetimeFigureOut">
               <a:rPr lang="en-US" dirty="0"/>
-              <a:t>7/17/2019</a:t>
+              <a:t>7/18/2019</a:t>
             </a:fld>
             <a:endParaRPr lang="en-US" dirty="0"/>
           </a:p>
@@ -1028,7 +1033,7 @@
           <a:p>
             <a:fld id="{5D6C7379-69CC-4837-9905-BEBA22830C8A}" type="datetimeFigureOut">
               <a:rPr lang="en-US" dirty="0"/>
-              <a:t>7/17/2019</a:t>
+              <a:t>7/18/2019</a:t>
             </a:fld>
             <a:endParaRPr lang="en-US" dirty="0"/>
           </a:p>
@@ -1449,7 +1454,7 @@
           <a:p>
             <a:fld id="{49EB8B7E-8AEE-4F10-BFEE-C999AD004D36}" type="datetimeFigureOut">
               <a:rPr lang="en-US" dirty="0"/>
-              <a:t>7/17/2019</a:t>
+              <a:t>7/18/2019</a:t>
             </a:fld>
             <a:endParaRPr lang="en-US" dirty="0"/>
           </a:p>
@@ -1990,7 +1995,7 @@
           <a:p>
             <a:fld id="{8668F3F9-58BC-440B-B37B-805B9055EF92}" type="datetimeFigureOut">
               <a:rPr lang="en-US" dirty="0"/>
-              <a:t>7/17/2019</a:t>
+              <a:t>7/18/2019</a:t>
             </a:fld>
             <a:endParaRPr lang="en-US" dirty="0"/>
           </a:p>
@@ -2816,7 +2821,7 @@
           <a:p>
             <a:fld id="{0D5A53AF-48EA-489D-8260-9DCAB666386A}" type="datetimeFigureOut">
               <a:rPr lang="en-US" dirty="0"/>
-              <a:t>7/17/2019</a:t>
+              <a:t>7/18/2019</a:t>
             </a:fld>
             <a:endParaRPr lang="en-US" dirty="0"/>
           </a:p>
@@ -2981,7 +2986,7 @@
           <a:p>
             <a:fld id="{0DED02AE-B9A4-47BD-AF8E-97E16144138B}" type="datetimeFigureOut">
               <a:rPr lang="en-US" dirty="0"/>
-              <a:t>7/17/2019</a:t>
+              <a:t>7/18/2019</a:t>
             </a:fld>
             <a:endParaRPr lang="en-US" dirty="0"/>
           </a:p>
@@ -3156,7 +3161,7 @@
           <a:p>
             <a:fld id="{CF0FD78B-DB02-4362-BCDC-98A55456977C}" type="datetimeFigureOut">
               <a:rPr lang="en-US" dirty="0"/>
-              <a:t>7/17/2019</a:t>
+              <a:t>7/18/2019</a:t>
             </a:fld>
             <a:endParaRPr lang="en-US" dirty="0"/>
           </a:p>
@@ -3321,7 +3326,7 @@
           <a:p>
             <a:fld id="{99916976-5D93-46E4-A98A-FAD63E4D0EA8}" type="datetimeFigureOut">
               <a:rPr lang="en-US" dirty="0"/>
-              <a:t>7/17/2019</a:t>
+              <a:t>7/18/2019</a:t>
             </a:fld>
             <a:endParaRPr lang="en-US" dirty="0"/>
           </a:p>
@@ -3573,7 +3578,7 @@
           <a:p>
             <a:fld id="{0F39F4F5-F4D2-4D2A-AB60-88D37ADCB869}" type="datetimeFigureOut">
               <a:rPr lang="en-US" dirty="0"/>
-              <a:t>7/17/2019</a:t>
+              <a:t>7/18/2019</a:t>
             </a:fld>
             <a:endParaRPr lang="en-US" dirty="0"/>
           </a:p>
@@ -3800,7 +3805,7 @@
           <a:p>
             <a:fld id="{D23BC6CE-6D1E-47E5-8859-F31AC5380EB2}" type="datetimeFigureOut">
               <a:rPr lang="en-US" dirty="0"/>
-              <a:t>7/17/2019</a:t>
+              <a:t>7/18/2019</a:t>
             </a:fld>
             <a:endParaRPr lang="en-US" dirty="0"/>
           </a:p>
@@ -4188,7 +4193,7 @@
           <a:p>
             <a:fld id="{B1B4E7C4-4DA4-404D-9965-B13F2DD7D8BF}" type="datetimeFigureOut">
               <a:rPr lang="en-US" dirty="0"/>
-              <a:t>7/17/2019</a:t>
+              <a:t>7/18/2019</a:t>
             </a:fld>
             <a:endParaRPr lang="en-US" dirty="0"/>
           </a:p>
@@ -4301,7 +4306,7 @@
           <a:p>
             <a:fld id="{476FB7AA-4A53-424F-AD41-70827B6504BA}" type="datetimeFigureOut">
               <a:rPr lang="en-US" dirty="0"/>
-              <a:t>7/17/2019</a:t>
+              <a:t>7/18/2019</a:t>
             </a:fld>
             <a:endParaRPr lang="en-US" dirty="0"/>
           </a:p>
@@ -4391,7 +4396,7 @@
           <a:p>
             <a:fld id="{E7884882-FB12-4BC8-9960-9AD8104D7FAE}" type="datetimeFigureOut">
               <a:rPr lang="en-US" dirty="0"/>
-              <a:t>7/17/2019</a:t>
+              <a:t>7/18/2019</a:t>
             </a:fld>
             <a:endParaRPr lang="en-US" dirty="0"/>
           </a:p>
@@ -4659,7 +4664,7 @@
           <a:p>
             <a:fld id="{F7D1BD23-6E54-4D9D-AD88-A2813C73CC25}" type="datetimeFigureOut">
               <a:rPr lang="en-US" dirty="0"/>
-              <a:t>7/17/2019</a:t>
+              <a:t>7/18/2019</a:t>
             </a:fld>
             <a:endParaRPr lang="en-US" dirty="0"/>
           </a:p>
@@ -4935,7 +4940,7 @@
           <a:p>
             <a:fld id="{1471A834-4F3C-4AF9-9C74-05EC35A0F292}" type="datetimeFigureOut">
               <a:rPr lang="en-US" dirty="0"/>
-              <a:t>7/17/2019</a:t>
+              <a:t>7/18/2019</a:t>
             </a:fld>
             <a:endParaRPr lang="en-US" dirty="0"/>
           </a:p>
@@ -5170,7 +5175,7 @@
           <a:p>
             <a:fld id="{51CF1133-3259-4C45-BABA-5B62D9C6F78D}" type="datetimeFigureOut">
               <a:rPr lang="en-US" dirty="0"/>
-              <a:t>7/17/2019</a:t>
+              <a:t>7/18/2019</a:t>
             </a:fld>
             <a:endParaRPr lang="en-US" dirty="0"/>
           </a:p>
@@ -6105,7 +6110,7 @@
           <a:p>
             <a:r>
               <a:rPr lang="en-US" sz="3600" dirty="0"/>
-              <a:t>Simple Syntax</a:t>
+              <a:t>Simple Syntax that makes sense</a:t>
             </a:r>
           </a:p>
           <a:p>
@@ -6114,7 +6119,7 @@
           <a:p>
             <a:r>
               <a:rPr lang="en-US" sz="3600" dirty="0"/>
-              <a:t>Objects</a:t>
+              <a:t>Objects &amp; properties</a:t>
             </a:r>
           </a:p>
           <a:p>

</xml_diff>